<commit_message>
First commit Basic UI
</commit_message>
<xml_diff>
--- a/Graphics.pptx
+++ b/Graphics.pptx
@@ -9,6 +9,7 @@
     <p:sldId id="258" r:id="rId3"/>
     <p:sldId id="257" r:id="rId4"/>
     <p:sldId id="259" r:id="rId5"/>
+    <p:sldId id="260" r:id="rId6"/>
   </p:sldIdLst>
   <p:sldSz cx="12192000" cy="6858000"/>
   <p:notesSz cx="6858000" cy="9144000"/>
@@ -4698,6 +4699,958 @@
 </p:sld>
 </file>
 
+<file path=ppt/slides/slide5.xml><?xml version="1.0" encoding="utf-8"?>
+<p:sld xmlns:a="http://schemas.openxmlformats.org/drawingml/2006/main" xmlns:r="http://schemas.openxmlformats.org/officeDocument/2006/relationships" xmlns:p="http://schemas.openxmlformats.org/presentationml/2006/main">
+  <p:cSld>
+    <p:spTree>
+      <p:nvGrpSpPr>
+        <p:cNvPr id="1" name=""/>
+        <p:cNvGrpSpPr/>
+        <p:nvPr/>
+      </p:nvGrpSpPr>
+      <p:grpSpPr>
+        <a:xfrm>
+          <a:off x="0" y="0"/>
+          <a:ext cx="0" cy="0"/>
+          <a:chOff x="0" y="0"/>
+          <a:chExt cx="0" cy="0"/>
+        </a:xfrm>
+      </p:grpSpPr>
+      <p:pic>
+        <p:nvPicPr>
+          <p:cNvPr id="8" name="Picture 7"/>
+          <p:cNvPicPr>
+            <a:picLocks noChangeAspect="1"/>
+          </p:cNvPicPr>
+          <p:nvPr/>
+        </p:nvPicPr>
+        <p:blipFill>
+          <a:blip r:embed="rId2"/>
+          <a:stretch>
+            <a:fillRect/>
+          </a:stretch>
+        </p:blipFill>
+        <p:spPr>
+          <a:xfrm>
+            <a:off x="0" y="-5101"/>
+            <a:ext cx="441998" cy="449619"/>
+          </a:xfrm>
+          <a:prstGeom prst="rect">
+            <a:avLst/>
+          </a:prstGeom>
+        </p:spPr>
+      </p:pic>
+      <p:grpSp>
+        <p:nvGrpSpPr>
+          <p:cNvPr id="3" name="Group 2"/>
+          <p:cNvGrpSpPr/>
+          <p:nvPr/>
+        </p:nvGrpSpPr>
+        <p:grpSpPr>
+          <a:xfrm>
+            <a:off x="4528867" y="491706"/>
+            <a:ext cx="3240000" cy="5760000"/>
+            <a:chOff x="4528867" y="491706"/>
+            <a:chExt cx="3240000" cy="5760000"/>
+          </a:xfrm>
+        </p:grpSpPr>
+        <p:sp>
+          <p:nvSpPr>
+            <p:cNvPr id="5" name="Rectangle 4"/>
+            <p:cNvSpPr/>
+            <p:nvPr/>
+          </p:nvSpPr>
+          <p:spPr>
+            <a:xfrm>
+              <a:off x="4528867" y="491706"/>
+              <a:ext cx="3240000" cy="5760000"/>
+            </a:xfrm>
+            <a:prstGeom prst="rect">
+              <a:avLst/>
+            </a:prstGeom>
+            <a:solidFill>
+              <a:srgbClr val="055E98"/>
+            </a:solidFill>
+          </p:spPr>
+          <p:style>
+            <a:lnRef idx="2">
+              <a:schemeClr val="accent1">
+                <a:shade val="50000"/>
+              </a:schemeClr>
+            </a:lnRef>
+            <a:fillRef idx="1">
+              <a:schemeClr val="accent1"/>
+            </a:fillRef>
+            <a:effectRef idx="0">
+              <a:schemeClr val="accent1"/>
+            </a:effectRef>
+            <a:fontRef idx="minor">
+              <a:schemeClr val="lt1"/>
+            </a:fontRef>
+          </p:style>
+          <p:txBody>
+            <a:bodyPr rtlCol="0" anchor="ctr"/>
+            <a:lstStyle/>
+            <a:p>
+              <a:pPr algn="ctr"/>
+              <a:endParaRPr lang="en-US"/>
+            </a:p>
+          </p:txBody>
+        </p:sp>
+        <p:sp>
+          <p:nvSpPr>
+            <p:cNvPr id="2" name="Rectangle 1"/>
+            <p:cNvSpPr/>
+            <p:nvPr/>
+          </p:nvSpPr>
+          <p:spPr>
+            <a:xfrm>
+              <a:off x="4528867" y="491706"/>
+              <a:ext cx="3240000" cy="5760000"/>
+            </a:xfrm>
+            <a:prstGeom prst="rect">
+              <a:avLst/>
+            </a:prstGeom>
+            <a:blipFill dpi="0" rotWithShape="1">
+              <a:blip r:embed="rId3">
+                <a:alphaModFix amt="15000"/>
+                <a:extLst>
+                  <a:ext uri="{28A0092B-C50C-407E-A947-70E740481C1C}">
+                    <a14:useLocalDpi xmlns:a14="http://schemas.microsoft.com/office/drawing/2010/main" val="0"/>
+                  </a:ext>
+                </a:extLst>
+              </a:blip>
+              <a:srcRect/>
+              <a:stretch>
+                <a:fillRect/>
+              </a:stretch>
+            </a:blipFill>
+            <a:ln>
+              <a:noFill/>
+            </a:ln>
+          </p:spPr>
+          <p:style>
+            <a:lnRef idx="2">
+              <a:schemeClr val="accent5">
+                <a:shade val="50000"/>
+              </a:schemeClr>
+            </a:lnRef>
+            <a:fillRef idx="1">
+              <a:schemeClr val="accent5"/>
+            </a:fillRef>
+            <a:effectRef idx="0">
+              <a:schemeClr val="accent5"/>
+            </a:effectRef>
+            <a:fontRef idx="minor">
+              <a:schemeClr val="lt1"/>
+            </a:fontRef>
+          </p:style>
+          <p:txBody>
+            <a:bodyPr rtlCol="0" anchor="ctr"/>
+            <a:lstStyle/>
+            <a:p>
+              <a:pPr algn="ctr"/>
+              <a:endParaRPr lang="en-US"/>
+            </a:p>
+          </p:txBody>
+        </p:sp>
+        <p:sp>
+          <p:nvSpPr>
+            <p:cNvPr id="9" name="Rectangle 8"/>
+            <p:cNvSpPr/>
+            <p:nvPr/>
+          </p:nvSpPr>
+          <p:spPr>
+            <a:xfrm>
+              <a:off x="4528867" y="570137"/>
+              <a:ext cx="2443298" cy="830997"/>
+            </a:xfrm>
+            <a:prstGeom prst="rect">
+              <a:avLst/>
+            </a:prstGeom>
+            <a:noFill/>
+          </p:spPr>
+          <p:txBody>
+            <a:bodyPr wrap="none" lIns="91440" tIns="45720" rIns="91440" bIns="45720">
+              <a:spAutoFit/>
+            </a:bodyPr>
+            <a:lstStyle/>
+            <a:p>
+              <a:pPr algn="ctr"/>
+              <a:r>
+                <a:rPr lang="en-US" sz="4800" b="1" dirty="0">
+                  <a:ln w="0"/>
+                  <a:solidFill>
+                    <a:schemeClr val="bg1"/>
+                  </a:solidFill>
+                  <a:effectLst>
+                    <a:outerShdw blurRad="38100" dist="19050" dir="2700000" algn="tl" rotWithShape="0">
+                      <a:schemeClr val="dk1">
+                        <a:alpha val="40000"/>
+                      </a:schemeClr>
+                    </a:outerShdw>
+                  </a:effectLst>
+                  <a:latin typeface="Bauhaus 93" panose="04030905020B02020C02" pitchFamily="82" charset="0"/>
+                </a:rPr>
+                <a:t>g</a:t>
+              </a:r>
+              <a:r>
+                <a:rPr lang="en-US" sz="4800" b="1" cap="none" spc="0" dirty="0" smtClean="0">
+                  <a:ln w="0"/>
+                  <a:solidFill>
+                    <a:schemeClr val="bg1"/>
+                  </a:solidFill>
+                  <a:effectLst>
+                    <a:outerShdw blurRad="38100" dist="19050" dir="2700000" algn="tl" rotWithShape="0">
+                      <a:schemeClr val="dk1">
+                        <a:alpha val="40000"/>
+                      </a:schemeClr>
+                    </a:outerShdw>
+                  </a:effectLst>
+                  <a:latin typeface="Bauhaus 93" panose="04030905020B02020C02" pitchFamily="82" charset="0"/>
+                </a:rPr>
+                <a:t>eecorn</a:t>
+              </a:r>
+              <a:endParaRPr lang="en-US" sz="4800" b="1" cap="none" spc="0" dirty="0">
+                <a:ln w="0"/>
+                <a:solidFill>
+                  <a:schemeClr val="bg1"/>
+                </a:solidFill>
+                <a:effectLst>
+                  <a:outerShdw blurRad="38100" dist="19050" dir="2700000" algn="tl" rotWithShape="0">
+                    <a:schemeClr val="dk1">
+                      <a:alpha val="40000"/>
+                    </a:schemeClr>
+                  </a:outerShdw>
+                </a:effectLst>
+                <a:latin typeface="Bauhaus 93" panose="04030905020B02020C02" pitchFamily="82" charset="0"/>
+              </a:endParaRPr>
+            </a:p>
+          </p:txBody>
+        </p:sp>
+      </p:grpSp>
+      <p:pic>
+        <p:nvPicPr>
+          <p:cNvPr id="4" name="Picture 3"/>
+          <p:cNvPicPr>
+            <a:picLocks noChangeAspect="1"/>
+          </p:cNvPicPr>
+          <p:nvPr/>
+        </p:nvPicPr>
+        <p:blipFill>
+          <a:blip r:embed="rId4">
+            <a:extLst>
+              <a:ext uri="{28A0092B-C50C-407E-A947-70E740481C1C}">
+                <a14:useLocalDpi xmlns:a14="http://schemas.microsoft.com/office/drawing/2010/main" val="0"/>
+              </a:ext>
+            </a:extLst>
+          </a:blip>
+          <a:stretch>
+            <a:fillRect/>
+          </a:stretch>
+        </p:blipFill>
+        <p:spPr>
+          <a:xfrm>
+            <a:off x="4981483" y="2168848"/>
+            <a:ext cx="2334768" cy="2584704"/>
+          </a:xfrm>
+          <a:prstGeom prst="ellipse">
+            <a:avLst/>
+          </a:prstGeom>
+          <a:ln>
+            <a:noFill/>
+          </a:ln>
+          <a:effectLst>
+            <a:softEdge rad="112500"/>
+          </a:effectLst>
+        </p:spPr>
+      </p:pic>
+      <p:sp>
+        <p:nvSpPr>
+          <p:cNvPr id="12" name="TextBox 11"/>
+          <p:cNvSpPr txBox="1"/>
+          <p:nvPr/>
+        </p:nvSpPr>
+        <p:spPr>
+          <a:xfrm>
+            <a:off x="5339190" y="4763100"/>
+            <a:ext cx="1619354" cy="400110"/>
+          </a:xfrm>
+          <a:prstGeom prst="rect">
+            <a:avLst/>
+          </a:prstGeom>
+          <a:noFill/>
+        </p:spPr>
+        <p:txBody>
+          <a:bodyPr wrap="none" rtlCol="0">
+            <a:spAutoFit/>
+          </a:bodyPr>
+          <a:lstStyle/>
+          <a:p>
+            <a:r>
+              <a:rPr lang="en-IN" sz="2000" b="1" dirty="0" smtClean="0">
+                <a:solidFill>
+                  <a:schemeClr val="bg1"/>
+                </a:solidFill>
+                <a:latin typeface="Adobe Song Std L" panose="02020300000000000000" pitchFamily="18" charset="-128"/>
+                <a:ea typeface="Adobe Song Std L" panose="02020300000000000000" pitchFamily="18" charset="-128"/>
+              </a:rPr>
+              <a:t>Alex Johnson</a:t>
+            </a:r>
+            <a:endParaRPr lang="en-US" sz="2000" b="1" dirty="0">
+              <a:solidFill>
+                <a:schemeClr val="bg1"/>
+              </a:solidFill>
+              <a:latin typeface="Adobe Song Std L" panose="02020300000000000000" pitchFamily="18" charset="-128"/>
+              <a:ea typeface="Adobe Song Std L" panose="02020300000000000000" pitchFamily="18" charset="-128"/>
+            </a:endParaRPr>
+          </a:p>
+        </p:txBody>
+      </p:sp>
+      <p:pic>
+        <p:nvPicPr>
+          <p:cNvPr id="1028" name="Picture 4" descr="Circle, dating, favorite, heart, like, love, red icon"/>
+          <p:cNvPicPr>
+            <a:picLocks noChangeAspect="1" noChangeArrowheads="1"/>
+          </p:cNvPicPr>
+          <p:nvPr/>
+        </p:nvPicPr>
+        <p:blipFill>
+          <a:blip r:embed="rId5" cstate="print">
+            <a:extLst>
+              <a:ext uri="{28A0092B-C50C-407E-A947-70E740481C1C}">
+                <a14:useLocalDpi xmlns:a14="http://schemas.microsoft.com/office/drawing/2010/main" val="0"/>
+              </a:ext>
+            </a:extLst>
+          </a:blip>
+          <a:srcRect/>
+          <a:stretch>
+            <a:fillRect/>
+          </a:stretch>
+        </p:blipFill>
+        <p:spPr bwMode="auto">
+          <a:xfrm>
+            <a:off x="4592731" y="5299155"/>
+            <a:ext cx="682596" cy="682596"/>
+          </a:xfrm>
+          <a:prstGeom prst="rect">
+            <a:avLst/>
+          </a:prstGeom>
+          <a:noFill/>
+          <a:extLst>
+            <a:ext uri="{909E8E84-426E-40DD-AFC4-6F175D3DCCD1}">
+              <a14:hiddenFill xmlns:a14="http://schemas.microsoft.com/office/drawing/2010/main">
+                <a:solidFill>
+                  <a:srgbClr val="FFFFFF"/>
+                </a:solidFill>
+              </a14:hiddenFill>
+            </a:ext>
+          </a:extLst>
+        </p:spPr>
+      </p:pic>
+      <p:sp>
+        <p:nvSpPr>
+          <p:cNvPr id="10" name="Rectangle 9"/>
+          <p:cNvSpPr/>
+          <p:nvPr/>
+        </p:nvSpPr>
+        <p:spPr>
+          <a:xfrm>
+            <a:off x="4656594" y="1378282"/>
+            <a:ext cx="2986410" cy="413310"/>
+          </a:xfrm>
+          <a:prstGeom prst="rect">
+            <a:avLst/>
+          </a:prstGeom>
+          <a:effectLst>
+            <a:softEdge rad="63500"/>
+          </a:effectLst>
+        </p:spPr>
+        <p:style>
+          <a:lnRef idx="2">
+            <a:schemeClr val="accent6">
+              <a:shade val="50000"/>
+            </a:schemeClr>
+          </a:lnRef>
+          <a:fillRef idx="1">
+            <a:schemeClr val="accent6"/>
+          </a:fillRef>
+          <a:effectRef idx="0">
+            <a:schemeClr val="accent6"/>
+          </a:effectRef>
+          <a:fontRef idx="minor">
+            <a:schemeClr val="lt1"/>
+          </a:fontRef>
+        </p:style>
+        <p:txBody>
+          <a:bodyPr rtlCol="0" anchor="ctr"/>
+          <a:lstStyle/>
+          <a:p>
+            <a:pPr algn="ctr"/>
+            <a:r>
+              <a:rPr lang="en-IN" dirty="0" smtClean="0"/>
+              <a:t>Python | Linux | Big Data | JS</a:t>
+            </a:r>
+            <a:endParaRPr lang="en-US" dirty="0"/>
+          </a:p>
+        </p:txBody>
+      </p:sp>
+      <p:sp>
+        <p:nvSpPr>
+          <p:cNvPr id="15" name="Rectangle 14"/>
+          <p:cNvSpPr/>
+          <p:nvPr/>
+        </p:nvSpPr>
+        <p:spPr>
+          <a:xfrm>
+            <a:off x="4655662" y="1828858"/>
+            <a:ext cx="2986410" cy="413310"/>
+          </a:xfrm>
+          <a:prstGeom prst="rect">
+            <a:avLst/>
+          </a:prstGeom>
+          <a:effectLst>
+            <a:softEdge rad="63500"/>
+          </a:effectLst>
+        </p:spPr>
+        <p:style>
+          <a:lnRef idx="2">
+            <a:schemeClr val="accent4">
+              <a:shade val="50000"/>
+            </a:schemeClr>
+          </a:lnRef>
+          <a:fillRef idx="1">
+            <a:schemeClr val="accent4"/>
+          </a:fillRef>
+          <a:effectRef idx="0">
+            <a:schemeClr val="accent4"/>
+          </a:effectRef>
+          <a:fontRef idx="minor">
+            <a:schemeClr val="lt1"/>
+          </a:fontRef>
+        </p:style>
+        <p:txBody>
+          <a:bodyPr rtlCol="0" anchor="ctr"/>
+          <a:lstStyle/>
+          <a:p>
+            <a:pPr algn="ctr"/>
+            <a:r>
+              <a:rPr lang="en-IN" sz="1600" dirty="0" smtClean="0"/>
+              <a:t>Flutter | Unity-3D | SolidWorks</a:t>
+            </a:r>
+            <a:endParaRPr lang="en-US" sz="1600" dirty="0"/>
+          </a:p>
+        </p:txBody>
+      </p:sp>
+      <p:sp>
+        <p:nvSpPr>
+          <p:cNvPr id="13" name="Horizontal Scroll 12"/>
+          <p:cNvSpPr/>
+          <p:nvPr/>
+        </p:nvSpPr>
+        <p:spPr>
+          <a:xfrm>
+            <a:off x="5339191" y="5029200"/>
+            <a:ext cx="2364198" cy="1222506"/>
+          </a:xfrm>
+          <a:prstGeom prst="horizontalScroll">
+            <a:avLst/>
+          </a:prstGeom>
+          <a:ln w="19050"/>
+        </p:spPr>
+        <p:style>
+          <a:lnRef idx="2">
+            <a:schemeClr val="dk1"/>
+          </a:lnRef>
+          <a:fillRef idx="1">
+            <a:schemeClr val="lt1"/>
+          </a:fillRef>
+          <a:effectRef idx="0">
+            <a:schemeClr val="dk1"/>
+          </a:effectRef>
+          <a:fontRef idx="minor">
+            <a:schemeClr val="dk1"/>
+          </a:fontRef>
+        </p:style>
+        <p:txBody>
+          <a:bodyPr rtlCol="0" anchor="ctr"/>
+          <a:lstStyle/>
+          <a:p>
+            <a:pPr algn="ctr"/>
+            <a:r>
+              <a:rPr lang="en-GB" sz="1100" b="1" dirty="0"/>
+              <a:t>The best thing about a boolean is even if you are wrong, you are only off by a bit</a:t>
+            </a:r>
+            <a:r>
+              <a:rPr lang="en-GB" sz="1100" b="1" dirty="0" smtClean="0"/>
+              <a:t>. But still it hurts to know that either we will match or we won’t!</a:t>
+            </a:r>
+            <a:endParaRPr lang="en-US" sz="1100" b="1" dirty="0"/>
+          </a:p>
+        </p:txBody>
+      </p:sp>
+      <p:sp>
+        <p:nvSpPr>
+          <p:cNvPr id="14" name="Hexagon 13"/>
+          <p:cNvSpPr/>
+          <p:nvPr/>
+        </p:nvSpPr>
+        <p:spPr>
+          <a:xfrm>
+            <a:off x="7077684" y="793295"/>
+            <a:ext cx="585664" cy="489960"/>
+          </a:xfrm>
+          <a:prstGeom prst="hexagon">
+            <a:avLst/>
+          </a:prstGeom>
+          <a:effectLst>
+            <a:softEdge rad="31750"/>
+          </a:effectLst>
+        </p:spPr>
+        <p:style>
+          <a:lnRef idx="1">
+            <a:schemeClr val="accent1"/>
+          </a:lnRef>
+          <a:fillRef idx="3">
+            <a:schemeClr val="accent1"/>
+          </a:fillRef>
+          <a:effectRef idx="2">
+            <a:schemeClr val="accent1"/>
+          </a:effectRef>
+          <a:fontRef idx="minor">
+            <a:schemeClr val="lt1"/>
+          </a:fontRef>
+        </p:style>
+        <p:txBody>
+          <a:bodyPr rtlCol="0" anchor="ctr"/>
+          <a:lstStyle/>
+          <a:p>
+            <a:pPr algn="ctr"/>
+            <a:endParaRPr lang="en-US" b="1" dirty="0">
+              <a:ln w="10160">
+                <a:solidFill>
+                  <a:schemeClr val="accent5"/>
+                </a:solidFill>
+                <a:prstDash val="solid"/>
+              </a:ln>
+              <a:solidFill>
+                <a:srgbClr val="FFFFFF"/>
+              </a:solidFill>
+              <a:effectLst>
+                <a:outerShdw blurRad="38100" dist="22860" dir="5400000" algn="tl" rotWithShape="0">
+                  <a:srgbClr val="000000">
+                    <a:alpha val="30000"/>
+                  </a:srgbClr>
+                </a:outerShdw>
+              </a:effectLst>
+            </a:endParaRPr>
+          </a:p>
+        </p:txBody>
+      </p:sp>
+      <p:sp>
+        <p:nvSpPr>
+          <p:cNvPr id="16" name="TextBox 15"/>
+          <p:cNvSpPr txBox="1"/>
+          <p:nvPr/>
+        </p:nvSpPr>
+        <p:spPr>
+          <a:xfrm flipH="1">
+            <a:off x="7109921" y="853609"/>
+            <a:ext cx="627142" cy="369332"/>
+          </a:xfrm>
+          <a:prstGeom prst="rect">
+            <a:avLst/>
+          </a:prstGeom>
+          <a:noFill/>
+        </p:spPr>
+        <p:txBody>
+          <a:bodyPr wrap="square" rtlCol="0">
+            <a:spAutoFit/>
+          </a:bodyPr>
+          <a:lstStyle/>
+          <a:p>
+            <a:r>
+              <a:rPr lang="en-IN" b="1" dirty="0" smtClean="0">
+                <a:solidFill>
+                  <a:schemeClr val="bg1"/>
+                </a:solidFill>
+              </a:rPr>
+              <a:t>245</a:t>
+            </a:r>
+            <a:endParaRPr lang="en-US" b="1" dirty="0">
+              <a:solidFill>
+                <a:schemeClr val="bg1"/>
+              </a:solidFill>
+            </a:endParaRPr>
+          </a:p>
+        </p:txBody>
+      </p:sp>
+      <p:cxnSp>
+        <p:nvCxnSpPr>
+          <p:cNvPr id="18" name="Straight Arrow Connector 17"/>
+          <p:cNvCxnSpPr>
+            <a:stCxn id="10" idx="1"/>
+          </p:cNvCxnSpPr>
+          <p:nvPr/>
+        </p:nvCxnSpPr>
+        <p:spPr>
+          <a:xfrm flipH="1">
+            <a:off x="3821502" y="1584937"/>
+            <a:ext cx="835092" cy="804580"/>
+          </a:xfrm>
+          <a:prstGeom prst="straightConnector1">
+            <a:avLst/>
+          </a:prstGeom>
+          <a:ln>
+            <a:solidFill>
+              <a:schemeClr val="tx1"/>
+            </a:solidFill>
+            <a:tailEnd type="triangle"/>
+          </a:ln>
+        </p:spPr>
+        <p:style>
+          <a:lnRef idx="1">
+            <a:schemeClr val="accent1"/>
+          </a:lnRef>
+          <a:fillRef idx="0">
+            <a:schemeClr val="accent1"/>
+          </a:fillRef>
+          <a:effectRef idx="0">
+            <a:schemeClr val="accent1"/>
+          </a:effectRef>
+          <a:fontRef idx="minor">
+            <a:schemeClr val="tx1"/>
+          </a:fontRef>
+        </p:style>
+      </p:cxnSp>
+      <p:cxnSp>
+        <p:nvCxnSpPr>
+          <p:cNvPr id="21" name="Straight Arrow Connector 20"/>
+          <p:cNvCxnSpPr/>
+          <p:nvPr/>
+        </p:nvCxnSpPr>
+        <p:spPr>
+          <a:xfrm>
+            <a:off x="7586955" y="2099254"/>
+            <a:ext cx="506801" cy="409014"/>
+          </a:xfrm>
+          <a:prstGeom prst="straightConnector1">
+            <a:avLst/>
+          </a:prstGeom>
+          <a:ln>
+            <a:tailEnd type="triangle"/>
+          </a:ln>
+        </p:spPr>
+        <p:style>
+          <a:lnRef idx="1">
+            <a:schemeClr val="dk1"/>
+          </a:lnRef>
+          <a:fillRef idx="0">
+            <a:schemeClr val="dk1"/>
+          </a:fillRef>
+          <a:effectRef idx="0">
+            <a:schemeClr val="dk1"/>
+          </a:effectRef>
+          <a:fontRef idx="minor">
+            <a:schemeClr val="tx1"/>
+          </a:fontRef>
+        </p:style>
+      </p:cxnSp>
+      <p:cxnSp>
+        <p:nvCxnSpPr>
+          <p:cNvPr id="24" name="Straight Arrow Connector 23"/>
+          <p:cNvCxnSpPr/>
+          <p:nvPr/>
+        </p:nvCxnSpPr>
+        <p:spPr>
+          <a:xfrm>
+            <a:off x="7578398" y="1113461"/>
+            <a:ext cx="506801" cy="409014"/>
+          </a:xfrm>
+          <a:prstGeom prst="straightConnector1">
+            <a:avLst/>
+          </a:prstGeom>
+          <a:ln>
+            <a:tailEnd type="triangle"/>
+          </a:ln>
+        </p:spPr>
+        <p:style>
+          <a:lnRef idx="1">
+            <a:schemeClr val="dk1"/>
+          </a:lnRef>
+          <a:fillRef idx="0">
+            <a:schemeClr val="dk1"/>
+          </a:fillRef>
+          <a:effectRef idx="0">
+            <a:schemeClr val="dk1"/>
+          </a:effectRef>
+          <a:fontRef idx="minor">
+            <a:schemeClr val="tx1"/>
+          </a:fontRef>
+        </p:style>
+      </p:cxnSp>
+      <p:cxnSp>
+        <p:nvCxnSpPr>
+          <p:cNvPr id="25" name="Straight Arrow Connector 24"/>
+          <p:cNvCxnSpPr/>
+          <p:nvPr/>
+        </p:nvCxnSpPr>
+        <p:spPr>
+          <a:xfrm>
+            <a:off x="7579330" y="5861325"/>
+            <a:ext cx="506801" cy="409014"/>
+          </a:xfrm>
+          <a:prstGeom prst="straightConnector1">
+            <a:avLst/>
+          </a:prstGeom>
+          <a:ln>
+            <a:tailEnd type="triangle"/>
+          </a:ln>
+        </p:spPr>
+        <p:style>
+          <a:lnRef idx="1">
+            <a:schemeClr val="dk1"/>
+          </a:lnRef>
+          <a:fillRef idx="0">
+            <a:schemeClr val="dk1"/>
+          </a:fillRef>
+          <a:effectRef idx="0">
+            <a:schemeClr val="dk1"/>
+          </a:effectRef>
+          <a:fontRef idx="minor">
+            <a:schemeClr val="tx1"/>
+          </a:fontRef>
+        </p:style>
+      </p:cxnSp>
+      <p:cxnSp>
+        <p:nvCxnSpPr>
+          <p:cNvPr id="26" name="Straight Arrow Connector 25"/>
+          <p:cNvCxnSpPr/>
+          <p:nvPr/>
+        </p:nvCxnSpPr>
+        <p:spPr>
+          <a:xfrm flipH="1">
+            <a:off x="3627433" y="3599198"/>
+            <a:ext cx="1557091" cy="1048281"/>
+          </a:xfrm>
+          <a:prstGeom prst="straightConnector1">
+            <a:avLst/>
+          </a:prstGeom>
+          <a:ln>
+            <a:tailEnd type="triangle"/>
+          </a:ln>
+        </p:spPr>
+        <p:style>
+          <a:lnRef idx="1">
+            <a:schemeClr val="dk1"/>
+          </a:lnRef>
+          <a:fillRef idx="0">
+            <a:schemeClr val="dk1"/>
+          </a:fillRef>
+          <a:effectRef idx="0">
+            <a:schemeClr val="dk1"/>
+          </a:effectRef>
+          <a:fontRef idx="minor">
+            <a:schemeClr val="tx1"/>
+          </a:fontRef>
+        </p:style>
+      </p:cxnSp>
+      <p:cxnSp>
+        <p:nvCxnSpPr>
+          <p:cNvPr id="29" name="Straight Arrow Connector 28"/>
+          <p:cNvCxnSpPr/>
+          <p:nvPr/>
+        </p:nvCxnSpPr>
+        <p:spPr>
+          <a:xfrm flipH="1">
+            <a:off x="3907766" y="5862327"/>
+            <a:ext cx="771730" cy="389379"/>
+          </a:xfrm>
+          <a:prstGeom prst="straightConnector1">
+            <a:avLst/>
+          </a:prstGeom>
+          <a:ln>
+            <a:tailEnd type="triangle"/>
+          </a:ln>
+        </p:spPr>
+        <p:style>
+          <a:lnRef idx="1">
+            <a:schemeClr val="dk1"/>
+          </a:lnRef>
+          <a:fillRef idx="0">
+            <a:schemeClr val="dk1"/>
+          </a:fillRef>
+          <a:effectRef idx="0">
+            <a:schemeClr val="dk1"/>
+          </a:effectRef>
+          <a:fontRef idx="minor">
+            <a:schemeClr val="tx1"/>
+          </a:fontRef>
+        </p:style>
+      </p:cxnSp>
+      <p:sp>
+        <p:nvSpPr>
+          <p:cNvPr id="30" name="TextBox 29"/>
+          <p:cNvSpPr txBox="1"/>
+          <p:nvPr/>
+        </p:nvSpPr>
+        <p:spPr>
+          <a:xfrm>
+            <a:off x="2948903" y="2412852"/>
+            <a:ext cx="1192121" cy="338554"/>
+          </a:xfrm>
+          <a:prstGeom prst="rect">
+            <a:avLst/>
+          </a:prstGeom>
+          <a:noFill/>
+        </p:spPr>
+        <p:txBody>
+          <a:bodyPr wrap="none" rtlCol="0">
+            <a:spAutoFit/>
+          </a:bodyPr>
+          <a:lstStyle/>
+          <a:p>
+            <a:r>
+              <a:rPr lang="en-IN" sz="1600" dirty="0" smtClean="0"/>
+              <a:t>Skills I know</a:t>
+            </a:r>
+            <a:endParaRPr lang="en-US" sz="1600" dirty="0"/>
+          </a:p>
+        </p:txBody>
+      </p:sp>
+      <p:sp>
+        <p:nvSpPr>
+          <p:cNvPr id="33" name="TextBox 32"/>
+          <p:cNvSpPr txBox="1"/>
+          <p:nvPr/>
+        </p:nvSpPr>
+        <p:spPr>
+          <a:xfrm>
+            <a:off x="8013692" y="2412852"/>
+            <a:ext cx="2346733" cy="338554"/>
+          </a:xfrm>
+          <a:prstGeom prst="rect">
+            <a:avLst/>
+          </a:prstGeom>
+          <a:noFill/>
+        </p:spPr>
+        <p:txBody>
+          <a:bodyPr wrap="none" rtlCol="0">
+            <a:spAutoFit/>
+          </a:bodyPr>
+          <a:lstStyle/>
+          <a:p>
+            <a:r>
+              <a:rPr lang="en-IN" sz="1600" dirty="0" smtClean="0"/>
+              <a:t>Skills I am looking to learn</a:t>
+            </a:r>
+            <a:endParaRPr lang="en-US" sz="1600" dirty="0"/>
+          </a:p>
+        </p:txBody>
+      </p:sp>
+      <p:sp>
+        <p:nvSpPr>
+          <p:cNvPr id="34" name="TextBox 33"/>
+          <p:cNvSpPr txBox="1"/>
+          <p:nvPr/>
+        </p:nvSpPr>
+        <p:spPr>
+          <a:xfrm>
+            <a:off x="8085199" y="6101062"/>
+            <a:ext cx="950901" cy="338554"/>
+          </a:xfrm>
+          <a:prstGeom prst="rect">
+            <a:avLst/>
+          </a:prstGeom>
+          <a:noFill/>
+        </p:spPr>
+        <p:txBody>
+          <a:bodyPr wrap="none" rtlCol="0">
+            <a:spAutoFit/>
+          </a:bodyPr>
+          <a:lstStyle/>
+          <a:p>
+            <a:r>
+              <a:rPr lang="en-IN" sz="1600" dirty="0" smtClean="0"/>
+              <a:t>Short Bio</a:t>
+            </a:r>
+            <a:endParaRPr lang="en-US" sz="1600" dirty="0"/>
+          </a:p>
+        </p:txBody>
+      </p:sp>
+      <p:sp>
+        <p:nvSpPr>
+          <p:cNvPr id="35" name="TextBox 34"/>
+          <p:cNvSpPr txBox="1"/>
+          <p:nvPr/>
+        </p:nvSpPr>
+        <p:spPr>
+          <a:xfrm>
+            <a:off x="3320279" y="6131252"/>
+            <a:ext cx="506677" cy="338554"/>
+          </a:xfrm>
+          <a:prstGeom prst="rect">
+            <a:avLst/>
+          </a:prstGeom>
+          <a:noFill/>
+        </p:spPr>
+        <p:txBody>
+          <a:bodyPr wrap="none" rtlCol="0">
+            <a:spAutoFit/>
+          </a:bodyPr>
+          <a:lstStyle/>
+          <a:p>
+            <a:r>
+              <a:rPr lang="en-IN" sz="1600" dirty="0" smtClean="0"/>
+              <a:t>Like</a:t>
+            </a:r>
+            <a:endParaRPr lang="en-US" sz="1600" dirty="0"/>
+          </a:p>
+        </p:txBody>
+      </p:sp>
+      <p:sp>
+        <p:nvSpPr>
+          <p:cNvPr id="36" name="TextBox 35"/>
+          <p:cNvSpPr txBox="1"/>
+          <p:nvPr/>
+        </p:nvSpPr>
+        <p:spPr>
+          <a:xfrm>
+            <a:off x="8071191" y="1434624"/>
+            <a:ext cx="1399999" cy="338554"/>
+          </a:xfrm>
+          <a:prstGeom prst="rect">
+            <a:avLst/>
+          </a:prstGeom>
+          <a:noFill/>
+        </p:spPr>
+        <p:txBody>
+          <a:bodyPr wrap="none" rtlCol="0">
+            <a:spAutoFit/>
+          </a:bodyPr>
+          <a:lstStyle/>
+          <a:p>
+            <a:r>
+              <a:rPr lang="en-IN" sz="1600" dirty="0" smtClean="0"/>
+              <a:t>Geecorn Score</a:t>
+            </a:r>
+            <a:endParaRPr lang="en-US" sz="1600" dirty="0"/>
+          </a:p>
+        </p:txBody>
+      </p:sp>
+    </p:spTree>
+    <p:extLst>
+      <p:ext uri="{BB962C8B-B14F-4D97-AF65-F5344CB8AC3E}">
+        <p14:creationId xmlns:p14="http://schemas.microsoft.com/office/powerpoint/2010/main" val="458753625"/>
+      </p:ext>
+    </p:extLst>
+  </p:cSld>
+  <p:clrMapOvr>
+    <a:masterClrMapping/>
+  </p:clrMapOvr>
+</p:sld>
+</file>
+
 <file path=ppt/theme/theme1.xml><?xml version="1.0" encoding="utf-8"?>
 <a:theme xmlns:a="http://schemas.openxmlformats.org/drawingml/2006/main" name="Office Theme">
   <a:themeElements>

</xml_diff>